<commit_message>
Improved documentation & notebook on phase scan
</commit_message>
<xml_diff>
--- a/doc/WEST_Antenna_Circuit_Model.pptx
+++ b/doc/WEST_Antenna_Circuit_Model.pptx
@@ -5,7 +5,7 @@
     <p:sldMasterId id="2147483660" r:id="rId1"/>
   </p:sldMasterIdLst>
   <p:notesMasterIdLst>
-    <p:notesMasterId r:id="rId11"/>
+    <p:notesMasterId r:id="rId13"/>
   </p:notesMasterIdLst>
   <p:sldIdLst>
     <p:sldId id="256" r:id="rId2"/>
@@ -16,7 +16,9 @@
     <p:sldId id="257" r:id="rId7"/>
     <p:sldId id="276" r:id="rId8"/>
     <p:sldId id="273" r:id="rId9"/>
-    <p:sldId id="261" r:id="rId10"/>
+    <p:sldId id="277" r:id="rId10"/>
+    <p:sldId id="261" r:id="rId11"/>
+    <p:sldId id="278" r:id="rId12"/>
   </p:sldIdLst>
   <p:sldSz cx="12192000" cy="6858000"/>
   <p:notesSz cx="6858000" cy="9144000"/>
@@ -205,7 +207,7 @@
           <a:p>
             <a:fld id="{1376020A-F047-4D6F-8A37-6940ED7BDB0C}" type="datetimeFigureOut">
               <a:rPr lang="en-GB" smtClean="0"/>
-              <a:t>06/12/2020</a:t>
+              <a:t>12/12/2020</a:t>
             </a:fld>
             <a:endParaRPr lang="en-GB"/>
           </a:p>
@@ -5429,7 +5431,7 @@
                   </a:schemeClr>
                 </a:solidFill>
               </a:rPr>
-              <a:t>6 décembre 2020</a:t>
+              <a:t>12 décembre 2020</a:t>
             </a:fld>
             <a:endParaRPr lang="fr-FR" sz="1100" dirty="0">
               <a:solidFill>
@@ -5987,6 +5989,708 @@
     <p:extLst>
       <p:ext uri="{BB962C8B-B14F-4D97-AF65-F5344CB8AC3E}">
         <p14:creationId xmlns:p14="http://schemas.microsoft.com/office/powerpoint/2010/main" val="3704093453"/>
+      </p:ext>
+    </p:extLst>
+  </p:cSld>
+  <p:clrMapOvr>
+    <a:masterClrMapping/>
+  </p:clrMapOvr>
+  <p:timing>
+    <p:tnLst>
+      <p:par>
+        <p:cTn id="1" dur="indefinite" restart="never" nodeType="tmRoot"/>
+      </p:par>
+    </p:tnLst>
+  </p:timing>
+</p:sld>
+</file>
+
+<file path=ppt/slides/slide10.xml><?xml version="1.0" encoding="utf-8"?>
+<p:sld xmlns:a="http://schemas.openxmlformats.org/drawingml/2006/main" xmlns:r="http://schemas.openxmlformats.org/officeDocument/2006/relationships" xmlns:p="http://schemas.openxmlformats.org/presentationml/2006/main">
+  <p:cSld>
+    <p:spTree>
+      <p:nvGrpSpPr>
+        <p:cNvPr id="1" name=""/>
+        <p:cNvGrpSpPr/>
+        <p:nvPr/>
+      </p:nvGrpSpPr>
+      <p:grpSpPr>
+        <a:xfrm>
+          <a:off x="0" y="0"/>
+          <a:ext cx="0" cy="0"/>
+          <a:chOff x="0" y="0"/>
+          <a:chExt cx="0" cy="0"/>
+        </a:xfrm>
+      </p:grpSpPr>
+      <p:sp>
+        <p:nvSpPr>
+          <p:cNvPr id="2" name="Titre 1"/>
+          <p:cNvSpPr>
+            <a:spLocks noGrp="1"/>
+          </p:cNvSpPr>
+          <p:nvPr>
+            <p:ph type="title"/>
+          </p:nvPr>
+        </p:nvSpPr>
+        <p:spPr/>
+        <p:txBody>
+          <a:bodyPr/>
+          <a:lstStyle/>
+          <a:p>
+            <a:r>
+              <a:rPr lang="en-GB" dirty="0" smtClean="0"/>
+              <a:t>(Virtual) Experiment Description</a:t>
+            </a:r>
+            <a:endParaRPr lang="en-GB" dirty="0"/>
+          </a:p>
+        </p:txBody>
+      </p:sp>
+      <p:sp>
+        <p:nvSpPr>
+          <p:cNvPr id="3" name="Espace réservé du contenu 2"/>
+          <p:cNvSpPr>
+            <a:spLocks noGrp="1"/>
+          </p:cNvSpPr>
+          <p:nvPr>
+            <p:ph idx="1"/>
+          </p:nvPr>
+        </p:nvSpPr>
+        <p:spPr>
+          <a:xfrm>
+            <a:off x="87376" y="1630412"/>
+            <a:ext cx="12206224" cy="4776397"/>
+          </a:xfrm>
+        </p:spPr>
+        <p:txBody>
+          <a:bodyPr/>
+          <a:lstStyle/>
+          <a:p>
+            <a:r>
+              <a:rPr lang="fr-FR" dirty="0" err="1"/>
+              <a:t>Antenna</a:t>
+            </a:r>
+            <a:r>
+              <a:rPr lang="fr-FR" dirty="0"/>
+              <a:t> RF </a:t>
+            </a:r>
+            <a:r>
+              <a:rPr lang="fr-FR" dirty="0" smtClean="0"/>
+              <a:t>excitation</a:t>
+            </a:r>
+            <a:endParaRPr lang="fr-FR" dirty="0"/>
+          </a:p>
+          <a:p>
+            <a:pPr lvl="1"/>
+            <a:r>
+              <a:rPr lang="en-GB" dirty="0"/>
+              <a:t>Excitation left side: P</a:t>
+            </a:r>
+            <a:r>
+              <a:rPr lang="en-GB" baseline="-25000" dirty="0"/>
+              <a:t>in</a:t>
+            </a:r>
+            <a:r>
+              <a:rPr lang="en-GB" dirty="0"/>
+              <a:t>, </a:t>
+            </a:r>
+          </a:p>
+          <a:p>
+            <a:pPr lvl="1"/>
+            <a:r>
+              <a:rPr lang="en-GB" dirty="0"/>
+              <a:t>Excitation right side: P</a:t>
+            </a:r>
+            <a:r>
+              <a:rPr lang="en-GB" baseline="-25000" dirty="0"/>
+              <a:t>in</a:t>
+            </a:r>
+            <a:r>
+              <a:rPr lang="en-GB" dirty="0"/>
+              <a:t> x </a:t>
+            </a:r>
+            <a:r>
+              <a:rPr lang="en-GB" dirty="0" err="1"/>
+              <a:t>exp</a:t>
+            </a:r>
+            <a:r>
+              <a:rPr lang="en-GB" dirty="0"/>
+              <a:t>(j∆</a:t>
+            </a:r>
+            <a:r>
+              <a:rPr lang="el-GR" dirty="0"/>
+              <a:t>φ</a:t>
+            </a:r>
+            <a:r>
+              <a:rPr lang="en-GB" dirty="0"/>
+              <a:t>), with ∆</a:t>
+            </a:r>
+            <a:r>
+              <a:rPr lang="el-GR" dirty="0"/>
+              <a:t>φ</a:t>
+            </a:r>
+            <a:r>
+              <a:rPr lang="fr-FR" dirty="0"/>
+              <a:t> in [0, 180°]</a:t>
+            </a:r>
+          </a:p>
+          <a:p>
+            <a:pPr lvl="2"/>
+            <a:r>
+              <a:rPr lang="en-GB" dirty="0"/>
+              <a:t>Dipole: ∆</a:t>
+            </a:r>
+            <a:r>
+              <a:rPr lang="el-GR" dirty="0"/>
+              <a:t>φ</a:t>
+            </a:r>
+            <a:r>
+              <a:rPr lang="fr-FR" dirty="0"/>
+              <a:t>=180°</a:t>
+            </a:r>
+          </a:p>
+          <a:p>
+            <a:pPr lvl="2"/>
+            <a:r>
+              <a:rPr lang="en-GB" dirty="0"/>
+              <a:t>Monopole: ∆</a:t>
+            </a:r>
+            <a:r>
+              <a:rPr lang="el-GR" dirty="0"/>
+              <a:t>φ</a:t>
+            </a:r>
+            <a:r>
+              <a:rPr lang="fr-FR" dirty="0"/>
+              <a:t>=0°</a:t>
+            </a:r>
+            <a:endParaRPr lang="en-GB" dirty="0"/>
+          </a:p>
+          <a:p>
+            <a:endParaRPr lang="en-GB" dirty="0" smtClean="0"/>
+          </a:p>
+          <a:p>
+            <a:r>
+              <a:rPr lang="en-GB" dirty="0" smtClean="0"/>
+              <a:t>Antenna Matching Method (manual procedure)</a:t>
+            </a:r>
+          </a:p>
+          <a:p>
+            <a:pPr lvl="1"/>
+            <a:r>
+              <a:rPr lang="en-GB" dirty="0" smtClean="0"/>
+              <a:t>Match left side (right side detuned) -&gt; gives C1 and C2</a:t>
+            </a:r>
+          </a:p>
+          <a:p>
+            <a:pPr lvl="1"/>
+            <a:r>
+              <a:rPr lang="en-GB" dirty="0" smtClean="0"/>
+              <a:t>Match right side (left side detuned) -&gt; gives C3 and C4</a:t>
+            </a:r>
+          </a:p>
+          <a:p>
+            <a:pPr lvl="1"/>
+            <a:r>
+              <a:rPr lang="en-GB" dirty="0" smtClean="0"/>
+              <a:t>2 solutions can be found for each sides : solution “1”: </a:t>
+            </a:r>
+            <a:r>
+              <a:rPr lang="en-GB" dirty="0" err="1" smtClean="0"/>
+              <a:t>C</a:t>
+            </a:r>
+            <a:r>
+              <a:rPr lang="en-GB" baseline="-25000" dirty="0" err="1" smtClean="0"/>
+              <a:t>top</a:t>
+            </a:r>
+            <a:r>
+              <a:rPr lang="en-GB" dirty="0" smtClean="0"/>
+              <a:t> &gt; </a:t>
+            </a:r>
+            <a:r>
+              <a:rPr lang="en-GB" dirty="0" err="1" smtClean="0"/>
+              <a:t>C</a:t>
+            </a:r>
+            <a:r>
+              <a:rPr lang="en-GB" baseline="-25000" dirty="0" err="1" smtClean="0"/>
+              <a:t>bottom</a:t>
+            </a:r>
+            <a:r>
+              <a:rPr lang="en-GB" dirty="0" smtClean="0"/>
+              <a:t>, solution “2”: </a:t>
+            </a:r>
+            <a:r>
+              <a:rPr lang="en-GB" dirty="0" err="1" smtClean="0"/>
+              <a:t>C</a:t>
+            </a:r>
+            <a:r>
+              <a:rPr lang="en-GB" baseline="-25000" dirty="0" err="1" smtClean="0"/>
+              <a:t>top</a:t>
+            </a:r>
+            <a:r>
+              <a:rPr lang="en-GB" baseline="-25000" dirty="0" smtClean="0"/>
+              <a:t> </a:t>
+            </a:r>
+            <a:r>
+              <a:rPr lang="en-GB" dirty="0" smtClean="0"/>
+              <a:t>&lt; </a:t>
+            </a:r>
+            <a:r>
+              <a:rPr lang="en-GB" dirty="0" err="1" smtClean="0"/>
+              <a:t>C</a:t>
+            </a:r>
+            <a:r>
+              <a:rPr lang="en-GB" baseline="-25000" dirty="0" err="1" smtClean="0"/>
+              <a:t>bottom</a:t>
+            </a:r>
+            <a:endParaRPr lang="en-GB" dirty="0" smtClean="0"/>
+          </a:p>
+          <a:p>
+            <a:pPr lvl="1"/>
+            <a:r>
+              <a:rPr lang="en-GB" dirty="0"/>
+              <a:t>Setup antenna to (C1, C2, C3, C4) </a:t>
+            </a:r>
+            <a:r>
+              <a:rPr lang="en-GB" dirty="0" smtClean="0"/>
+              <a:t>with same solution on both sides:</a:t>
+            </a:r>
+          </a:p>
+          <a:p>
+            <a:pPr lvl="2"/>
+            <a:r>
+              <a:rPr lang="en-GB" dirty="0" smtClean="0"/>
+              <a:t>Optimum </a:t>
+            </a:r>
+            <a:r>
+              <a:rPr lang="en-GB" dirty="0"/>
+              <a:t>frequency to operate in dipole is f=f</a:t>
+            </a:r>
+            <a:r>
+              <a:rPr lang="en-GB" baseline="-25000" dirty="0"/>
+              <a:t>0</a:t>
+            </a:r>
+            <a:r>
+              <a:rPr lang="en-GB" dirty="0"/>
+              <a:t> + ∆f, where ∆f ~ 0.2 MHz (∆f = ∆f (f</a:t>
+            </a:r>
+            <a:r>
+              <a:rPr lang="en-GB" baseline="-25000" dirty="0"/>
+              <a:t>0</a:t>
+            </a:r>
+            <a:r>
+              <a:rPr lang="en-GB" dirty="0" smtClean="0"/>
+              <a:t>))</a:t>
+            </a:r>
+          </a:p>
+          <a:p>
+            <a:pPr lvl="2"/>
+            <a:r>
+              <a:rPr lang="en-GB" dirty="0"/>
+              <a:t>Optimum frequency to operate in </a:t>
+            </a:r>
+            <a:r>
+              <a:rPr lang="en-GB" dirty="0" smtClean="0"/>
+              <a:t>monopole </a:t>
+            </a:r>
+            <a:r>
+              <a:rPr lang="en-GB" dirty="0"/>
+              <a:t>is f=f</a:t>
+            </a:r>
+            <a:r>
+              <a:rPr lang="en-GB" baseline="-25000" dirty="0"/>
+              <a:t>0</a:t>
+            </a:r>
+            <a:r>
+              <a:rPr lang="en-GB" dirty="0"/>
+              <a:t> </a:t>
+            </a:r>
+            <a:r>
+              <a:rPr lang="en-GB" dirty="0" smtClean="0"/>
+              <a:t>- </a:t>
+            </a:r>
+            <a:r>
+              <a:rPr lang="en-GB" dirty="0"/>
+              <a:t>∆f, where ∆f ~ 0.2 MHz (∆f = ∆f (f</a:t>
+            </a:r>
+            <a:r>
+              <a:rPr lang="en-GB" baseline="-25000" dirty="0"/>
+              <a:t>0</a:t>
+            </a:r>
+            <a:r>
+              <a:rPr lang="en-GB" dirty="0"/>
+              <a:t>))</a:t>
+            </a:r>
+          </a:p>
+          <a:p>
+            <a:pPr lvl="2"/>
+            <a:endParaRPr lang="en-GB" dirty="0" smtClean="0"/>
+          </a:p>
+          <a:p>
+            <a:pPr lvl="2"/>
+            <a:endParaRPr lang="en-GB" dirty="0"/>
+          </a:p>
+          <a:p>
+            <a:pPr lvl="1"/>
+            <a:endParaRPr lang="fr-FR" dirty="0"/>
+          </a:p>
+          <a:p>
+            <a:endParaRPr lang="en-GB" dirty="0"/>
+          </a:p>
+        </p:txBody>
+      </p:sp>
+      <p:sp>
+        <p:nvSpPr>
+          <p:cNvPr id="4" name="Espace réservé du texte 3"/>
+          <p:cNvSpPr>
+            <a:spLocks noGrp="1"/>
+          </p:cNvSpPr>
+          <p:nvPr>
+            <p:ph type="body" sz="quarter" idx="12"/>
+          </p:nvPr>
+        </p:nvSpPr>
+        <p:spPr/>
+        <p:txBody>
+          <a:bodyPr/>
+          <a:lstStyle/>
+          <a:p>
+            <a:r>
+              <a:rPr lang="en-GB" dirty="0" smtClean="0"/>
+              <a:t>Assumed: one antenna working at f</a:t>
+            </a:r>
+            <a:r>
+              <a:rPr lang="en-GB" baseline="-25000" dirty="0" smtClean="0"/>
+              <a:t>0</a:t>
+            </a:r>
+            <a:endParaRPr lang="en-GB" dirty="0"/>
+          </a:p>
+        </p:txBody>
+      </p:sp>
+      <p:sp>
+        <p:nvSpPr>
+          <p:cNvPr id="5" name="Espace réservé du numéro de diapositive 4"/>
+          <p:cNvSpPr>
+            <a:spLocks noGrp="1"/>
+          </p:cNvSpPr>
+          <p:nvPr>
+            <p:ph type="sldNum" sz="quarter" idx="10"/>
+          </p:nvPr>
+        </p:nvSpPr>
+        <p:spPr/>
+        <p:txBody>
+          <a:bodyPr/>
+          <a:lstStyle/>
+          <a:p>
+            <a:fld id="{CB10B659-826B-4DD2-AF43-E1305E666421}" type="slidenum">
+              <a:rPr lang="en-GB" smtClean="0"/>
+              <a:t>10</a:t>
+            </a:fld>
+            <a:endParaRPr lang="en-GB"/>
+          </a:p>
+        </p:txBody>
+      </p:sp>
+    </p:spTree>
+    <p:extLst>
+      <p:ext uri="{BB962C8B-B14F-4D97-AF65-F5344CB8AC3E}">
+        <p14:creationId xmlns:p14="http://schemas.microsoft.com/office/powerpoint/2010/main" val="1676853691"/>
+      </p:ext>
+    </p:extLst>
+  </p:cSld>
+  <p:clrMapOvr>
+    <a:masterClrMapping/>
+  </p:clrMapOvr>
+  <p:timing>
+    <p:tnLst>
+      <p:par>
+        <p:cTn id="1" dur="indefinite" restart="never" nodeType="tmRoot"/>
+      </p:par>
+    </p:tnLst>
+  </p:timing>
+</p:sld>
+</file>
+
+<file path=ppt/slides/slide11.xml><?xml version="1.0" encoding="utf-8"?>
+<p:sld xmlns:a="http://schemas.openxmlformats.org/drawingml/2006/main" xmlns:r="http://schemas.openxmlformats.org/officeDocument/2006/relationships" xmlns:p="http://schemas.openxmlformats.org/presentationml/2006/main">
+  <p:cSld>
+    <p:spTree>
+      <p:nvGrpSpPr>
+        <p:cNvPr id="1" name=""/>
+        <p:cNvGrpSpPr/>
+        <p:nvPr/>
+      </p:nvGrpSpPr>
+      <p:grpSpPr>
+        <a:xfrm>
+          <a:off x="0" y="0"/>
+          <a:ext cx="0" cy="0"/>
+          <a:chOff x="0" y="0"/>
+          <a:chExt cx="0" cy="0"/>
+        </a:xfrm>
+      </p:grpSpPr>
+      <p:pic>
+        <p:nvPicPr>
+          <p:cNvPr id="14" name="Image 13"/>
+          <p:cNvPicPr>
+            <a:picLocks noChangeAspect="1"/>
+          </p:cNvPicPr>
+          <p:nvPr/>
+        </p:nvPicPr>
+        <p:blipFill>
+          <a:blip r:embed="rId2">
+            <a:extLst>
+              <a:ext uri="{28A0092B-C50C-407E-A947-70E740481C1C}">
+                <a14:useLocalDpi xmlns:a14="http://schemas.microsoft.com/office/drawing/2010/main" val="0"/>
+              </a:ext>
+            </a:extLst>
+          </a:blip>
+          <a:stretch>
+            <a:fillRect/>
+          </a:stretch>
+        </p:blipFill>
+        <p:spPr>
+          <a:xfrm>
+            <a:off x="0" y="2113959"/>
+            <a:ext cx="5818909" cy="4364181"/>
+          </a:xfrm>
+          <a:prstGeom prst="rect">
+            <a:avLst/>
+          </a:prstGeom>
+        </p:spPr>
+      </p:pic>
+      <p:pic>
+        <p:nvPicPr>
+          <p:cNvPr id="15" name="Image 14"/>
+          <p:cNvPicPr>
+            <a:picLocks noChangeAspect="1"/>
+          </p:cNvPicPr>
+          <p:nvPr/>
+        </p:nvPicPr>
+        <p:blipFill>
+          <a:blip r:embed="rId3">
+            <a:extLst>
+              <a:ext uri="{28A0092B-C50C-407E-A947-70E740481C1C}">
+                <a14:useLocalDpi xmlns:a14="http://schemas.microsoft.com/office/drawing/2010/main" val="0"/>
+              </a:ext>
+            </a:extLst>
+          </a:blip>
+          <a:stretch>
+            <a:fillRect/>
+          </a:stretch>
+        </p:blipFill>
+        <p:spPr>
+          <a:xfrm>
+            <a:off x="5690424" y="2118999"/>
+            <a:ext cx="5993426" cy="4495070"/>
+          </a:xfrm>
+          <a:prstGeom prst="rect">
+            <a:avLst/>
+          </a:prstGeom>
+        </p:spPr>
+      </p:pic>
+      <p:sp>
+        <p:nvSpPr>
+          <p:cNvPr id="5" name="Titre 4"/>
+          <p:cNvSpPr>
+            <a:spLocks noGrp="1"/>
+          </p:cNvSpPr>
+          <p:nvPr>
+            <p:ph type="title"/>
+          </p:nvPr>
+        </p:nvSpPr>
+        <p:spPr/>
+        <p:txBody>
+          <a:bodyPr/>
+          <a:lstStyle/>
+          <a:p>
+            <a:r>
+              <a:rPr lang="en-GB" dirty="0" smtClean="0"/>
+              <a:t>Left side matched (right side unmatched)</a:t>
+            </a:r>
+            <a:endParaRPr lang="en-GB" dirty="0"/>
+          </a:p>
+        </p:txBody>
+      </p:sp>
+      <p:sp>
+        <p:nvSpPr>
+          <p:cNvPr id="2" name="Espace réservé du numéro de diapositive 1"/>
+          <p:cNvSpPr>
+            <a:spLocks noGrp="1"/>
+          </p:cNvSpPr>
+          <p:nvPr>
+            <p:ph type="sldNum" sz="quarter" idx="10"/>
+          </p:nvPr>
+        </p:nvSpPr>
+        <p:spPr/>
+        <p:txBody>
+          <a:bodyPr/>
+          <a:lstStyle/>
+          <a:p>
+            <a:fld id="{CB10B659-826B-4DD2-AF43-E1305E666421}" type="slidenum">
+              <a:rPr lang="en-GB" smtClean="0"/>
+              <a:t>11</a:t>
+            </a:fld>
+            <a:endParaRPr lang="en-GB"/>
+          </a:p>
+        </p:txBody>
+      </p:sp>
+      <p:sp>
+        <p:nvSpPr>
+          <p:cNvPr id="6" name="Espace réservé du contenu 5"/>
+          <p:cNvSpPr>
+            <a:spLocks noGrp="1"/>
+          </p:cNvSpPr>
+          <p:nvPr>
+            <p:ph idx="1"/>
+          </p:nvPr>
+        </p:nvSpPr>
+        <p:spPr>
+          <a:xfrm>
+            <a:off x="341376" y="1630412"/>
+            <a:ext cx="11055323" cy="436748"/>
+          </a:xfrm>
+        </p:spPr>
+        <p:txBody>
+          <a:bodyPr/>
+          <a:lstStyle/>
+          <a:p>
+            <a:r>
+              <a:rPr lang="en-GB" dirty="0" smtClean="0"/>
+              <a:t> </a:t>
+            </a:r>
+            <a:endParaRPr lang="en-GB" dirty="0"/>
+          </a:p>
+        </p:txBody>
+      </p:sp>
+      <p:sp>
+        <p:nvSpPr>
+          <p:cNvPr id="7" name="Espace réservé du texte 6"/>
+          <p:cNvSpPr>
+            <a:spLocks noGrp="1"/>
+          </p:cNvSpPr>
+          <p:nvPr>
+            <p:ph type="body" sz="quarter" idx="12"/>
+          </p:nvPr>
+        </p:nvSpPr>
+        <p:spPr/>
+        <p:txBody>
+          <a:bodyPr/>
+          <a:lstStyle/>
+          <a:p>
+            <a:endParaRPr lang="en-GB"/>
+          </a:p>
+        </p:txBody>
+      </p:sp>
+      <p:sp>
+        <p:nvSpPr>
+          <p:cNvPr id="11" name="ZoneTexte 10"/>
+          <p:cNvSpPr txBox="1"/>
+          <p:nvPr/>
+        </p:nvSpPr>
+        <p:spPr>
+          <a:xfrm>
+            <a:off x="7578436" y="1965893"/>
+            <a:ext cx="2217402" cy="369332"/>
+          </a:xfrm>
+          <a:prstGeom prst="rect">
+            <a:avLst/>
+          </a:prstGeom>
+          <a:noFill/>
+        </p:spPr>
+        <p:txBody>
+          <a:bodyPr wrap="none" rtlCol="0">
+            <a:spAutoFit/>
+          </a:bodyPr>
+          <a:lstStyle/>
+          <a:p>
+            <a:pPr algn="l"/>
+            <a:r>
+              <a:rPr lang="en-GB" sz="1800" dirty="0" smtClean="0"/>
+              <a:t>Solution 2 (</a:t>
+            </a:r>
+            <a:r>
+              <a:rPr lang="en-GB" sz="1800" dirty="0" err="1" smtClean="0"/>
+              <a:t>C</a:t>
+            </a:r>
+            <a:r>
+              <a:rPr lang="en-GB" sz="1800" baseline="-25000" dirty="0" err="1" smtClean="0"/>
+              <a:t>top</a:t>
+            </a:r>
+            <a:r>
+              <a:rPr lang="en-GB" sz="1800" dirty="0" smtClean="0"/>
+              <a:t> &lt; </a:t>
+            </a:r>
+            <a:r>
+              <a:rPr lang="en-GB" sz="1800" dirty="0" err="1" smtClean="0"/>
+              <a:t>C</a:t>
+            </a:r>
+            <a:r>
+              <a:rPr lang="en-GB" sz="1800" baseline="-25000" dirty="0" err="1" smtClean="0"/>
+              <a:t>bot</a:t>
+            </a:r>
+            <a:r>
+              <a:rPr lang="en-GB" sz="1800" dirty="0" smtClean="0"/>
+              <a:t>)</a:t>
+            </a:r>
+            <a:endParaRPr lang="en-GB" sz="1800" dirty="0"/>
+          </a:p>
+        </p:txBody>
+      </p:sp>
+      <p:sp>
+        <p:nvSpPr>
+          <p:cNvPr id="13" name="ZoneTexte 12"/>
+          <p:cNvSpPr txBox="1"/>
+          <p:nvPr/>
+        </p:nvSpPr>
+        <p:spPr>
+          <a:xfrm>
+            <a:off x="2215494" y="2039289"/>
+            <a:ext cx="2217402" cy="369332"/>
+          </a:xfrm>
+          <a:prstGeom prst="rect">
+            <a:avLst/>
+          </a:prstGeom>
+          <a:noFill/>
+        </p:spPr>
+        <p:txBody>
+          <a:bodyPr wrap="none" rtlCol="0">
+            <a:spAutoFit/>
+          </a:bodyPr>
+          <a:lstStyle/>
+          <a:p>
+            <a:pPr algn="l"/>
+            <a:r>
+              <a:rPr lang="en-GB" sz="1800" dirty="0" smtClean="0"/>
+              <a:t>Solution 1 (</a:t>
+            </a:r>
+            <a:r>
+              <a:rPr lang="en-GB" sz="1800" dirty="0" err="1" smtClean="0"/>
+              <a:t>C</a:t>
+            </a:r>
+            <a:r>
+              <a:rPr lang="en-GB" sz="1800" baseline="-25000" dirty="0" err="1" smtClean="0"/>
+              <a:t>top</a:t>
+            </a:r>
+            <a:r>
+              <a:rPr lang="en-GB" sz="1800" dirty="0" smtClean="0"/>
+              <a:t> &gt; </a:t>
+            </a:r>
+            <a:r>
+              <a:rPr lang="en-GB" sz="1800" dirty="0" err="1" smtClean="0"/>
+              <a:t>C</a:t>
+            </a:r>
+            <a:r>
+              <a:rPr lang="en-GB" sz="1800" baseline="-25000" dirty="0" err="1" smtClean="0"/>
+              <a:t>bot</a:t>
+            </a:r>
+            <a:r>
+              <a:rPr lang="en-GB" sz="1800" dirty="0" smtClean="0"/>
+              <a:t>)</a:t>
+            </a:r>
+            <a:endParaRPr lang="en-GB" sz="1800" dirty="0"/>
+          </a:p>
+        </p:txBody>
+      </p:sp>
+    </p:spTree>
+    <p:extLst>
+      <p:ext uri="{BB962C8B-B14F-4D97-AF65-F5344CB8AC3E}">
+        <p14:creationId xmlns:p14="http://schemas.microsoft.com/office/powerpoint/2010/main" val="2789153539"/>
       </p:ext>
     </p:extLst>
   </p:cSld>
@@ -16439,349 +17143,7 @@
       </p:grpSpPr>
       <p:sp>
         <p:nvSpPr>
-          <p:cNvPr id="2" name="Titre 1"/>
-          <p:cNvSpPr>
-            <a:spLocks noGrp="1"/>
-          </p:cNvSpPr>
-          <p:nvPr>
-            <p:ph type="title"/>
-          </p:nvPr>
-        </p:nvSpPr>
-        <p:spPr/>
-        <p:txBody>
-          <a:bodyPr/>
-          <a:lstStyle/>
-          <a:p>
-            <a:r>
-              <a:rPr lang="en-GB" dirty="0" smtClean="0"/>
-              <a:t>(Virtual) Experiment Description</a:t>
-            </a:r>
-            <a:endParaRPr lang="en-GB" dirty="0"/>
-          </a:p>
-        </p:txBody>
-      </p:sp>
-      <p:sp>
-        <p:nvSpPr>
-          <p:cNvPr id="3" name="Espace réservé du contenu 2"/>
-          <p:cNvSpPr>
-            <a:spLocks noGrp="1"/>
-          </p:cNvSpPr>
-          <p:nvPr>
-            <p:ph idx="1"/>
-          </p:nvPr>
-        </p:nvSpPr>
-        <p:spPr>
-          <a:xfrm>
-            <a:off x="87376" y="1630412"/>
-            <a:ext cx="12206224" cy="4776397"/>
-          </a:xfrm>
-        </p:spPr>
-        <p:txBody>
-          <a:bodyPr/>
-          <a:lstStyle/>
-          <a:p>
-            <a:r>
-              <a:rPr lang="fr-FR" dirty="0" err="1"/>
-              <a:t>Antenna</a:t>
-            </a:r>
-            <a:r>
-              <a:rPr lang="fr-FR" dirty="0"/>
-              <a:t> RF </a:t>
-            </a:r>
-            <a:r>
-              <a:rPr lang="fr-FR" dirty="0" smtClean="0"/>
-              <a:t>excitation</a:t>
-            </a:r>
-            <a:endParaRPr lang="fr-FR" dirty="0"/>
-          </a:p>
-          <a:p>
-            <a:pPr lvl="1"/>
-            <a:r>
-              <a:rPr lang="en-GB" dirty="0"/>
-              <a:t>Excitation left side: P</a:t>
-            </a:r>
-            <a:r>
-              <a:rPr lang="en-GB" baseline="-25000" dirty="0"/>
-              <a:t>in</a:t>
-            </a:r>
-            <a:r>
-              <a:rPr lang="en-GB" dirty="0"/>
-              <a:t>, </a:t>
-            </a:r>
-          </a:p>
-          <a:p>
-            <a:pPr lvl="1"/>
-            <a:r>
-              <a:rPr lang="en-GB" dirty="0"/>
-              <a:t>Excitation right side: P</a:t>
-            </a:r>
-            <a:r>
-              <a:rPr lang="en-GB" baseline="-25000" dirty="0"/>
-              <a:t>in</a:t>
-            </a:r>
-            <a:r>
-              <a:rPr lang="en-GB" dirty="0"/>
-              <a:t> x </a:t>
-            </a:r>
-            <a:r>
-              <a:rPr lang="en-GB" dirty="0" err="1"/>
-              <a:t>exp</a:t>
-            </a:r>
-            <a:r>
-              <a:rPr lang="en-GB" dirty="0"/>
-              <a:t>(j∆</a:t>
-            </a:r>
-            <a:r>
-              <a:rPr lang="el-GR" dirty="0"/>
-              <a:t>φ</a:t>
-            </a:r>
-            <a:r>
-              <a:rPr lang="en-GB" dirty="0"/>
-              <a:t>), with ∆</a:t>
-            </a:r>
-            <a:r>
-              <a:rPr lang="el-GR" dirty="0"/>
-              <a:t>φ</a:t>
-            </a:r>
-            <a:r>
-              <a:rPr lang="fr-FR" dirty="0"/>
-              <a:t> in [0, 180°]</a:t>
-            </a:r>
-          </a:p>
-          <a:p>
-            <a:pPr lvl="2"/>
-            <a:r>
-              <a:rPr lang="en-GB" dirty="0"/>
-              <a:t>Dipole: ∆</a:t>
-            </a:r>
-            <a:r>
-              <a:rPr lang="el-GR" dirty="0"/>
-              <a:t>φ</a:t>
-            </a:r>
-            <a:r>
-              <a:rPr lang="fr-FR" dirty="0"/>
-              <a:t>=180°</a:t>
-            </a:r>
-          </a:p>
-          <a:p>
-            <a:pPr lvl="2"/>
-            <a:r>
-              <a:rPr lang="en-GB" dirty="0"/>
-              <a:t>Monopole: ∆</a:t>
-            </a:r>
-            <a:r>
-              <a:rPr lang="el-GR" dirty="0"/>
-              <a:t>φ</a:t>
-            </a:r>
-            <a:r>
-              <a:rPr lang="fr-FR" dirty="0"/>
-              <a:t>=0°</a:t>
-            </a:r>
-            <a:endParaRPr lang="en-GB" dirty="0"/>
-          </a:p>
-          <a:p>
-            <a:endParaRPr lang="en-GB" dirty="0" smtClean="0"/>
-          </a:p>
-          <a:p>
-            <a:r>
-              <a:rPr lang="en-GB" dirty="0" smtClean="0"/>
-              <a:t>Antenna Tuning Method (manual procedure)</a:t>
-            </a:r>
-          </a:p>
-          <a:p>
-            <a:pPr lvl="1"/>
-            <a:r>
-              <a:rPr lang="en-GB" dirty="0" smtClean="0"/>
-              <a:t>Match left side (right side detuned) -&gt; gives C1 and C2</a:t>
-            </a:r>
-          </a:p>
-          <a:p>
-            <a:pPr lvl="1"/>
-            <a:r>
-              <a:rPr lang="en-GB" dirty="0" smtClean="0"/>
-              <a:t>Match right side (left side detuned) -&gt; gives C3 and C4</a:t>
-            </a:r>
-          </a:p>
-          <a:p>
-            <a:pPr lvl="1"/>
-            <a:r>
-              <a:rPr lang="en-GB" dirty="0" smtClean="0"/>
-              <a:t>2 solutions can be found for each sides : solution “1”: </a:t>
-            </a:r>
-            <a:r>
-              <a:rPr lang="en-GB" dirty="0" err="1" smtClean="0"/>
-              <a:t>C</a:t>
-            </a:r>
-            <a:r>
-              <a:rPr lang="en-GB" baseline="-25000" dirty="0" err="1" smtClean="0"/>
-              <a:t>top</a:t>
-            </a:r>
-            <a:r>
-              <a:rPr lang="en-GB" dirty="0" smtClean="0"/>
-              <a:t> &gt; </a:t>
-            </a:r>
-            <a:r>
-              <a:rPr lang="en-GB" dirty="0" err="1" smtClean="0"/>
-              <a:t>C</a:t>
-            </a:r>
-            <a:r>
-              <a:rPr lang="en-GB" baseline="-25000" dirty="0" err="1" smtClean="0"/>
-              <a:t>bottom</a:t>
-            </a:r>
-            <a:r>
-              <a:rPr lang="en-GB" dirty="0" smtClean="0"/>
-              <a:t>, solution “2”: </a:t>
-            </a:r>
-            <a:r>
-              <a:rPr lang="en-GB" dirty="0" err="1" smtClean="0"/>
-              <a:t>C</a:t>
-            </a:r>
-            <a:r>
-              <a:rPr lang="en-GB" baseline="-25000" dirty="0" err="1" smtClean="0"/>
-              <a:t>top</a:t>
-            </a:r>
-            <a:r>
-              <a:rPr lang="en-GB" baseline="-25000" dirty="0" smtClean="0"/>
-              <a:t> </a:t>
-            </a:r>
-            <a:r>
-              <a:rPr lang="en-GB" dirty="0" smtClean="0"/>
-              <a:t>&lt; </a:t>
-            </a:r>
-            <a:r>
-              <a:rPr lang="en-GB" dirty="0" err="1" smtClean="0"/>
-              <a:t>C</a:t>
-            </a:r>
-            <a:r>
-              <a:rPr lang="en-GB" baseline="-25000" dirty="0" err="1" smtClean="0"/>
-              <a:t>bottom</a:t>
-            </a:r>
-            <a:endParaRPr lang="en-GB" dirty="0" smtClean="0"/>
-          </a:p>
-          <a:p>
-            <a:pPr lvl="1"/>
-            <a:r>
-              <a:rPr lang="en-GB" dirty="0"/>
-              <a:t>Setup antenna to (C1, C2, C3, C4) </a:t>
-            </a:r>
-            <a:r>
-              <a:rPr lang="en-GB" dirty="0" smtClean="0"/>
-              <a:t>with same solution on both sides:</a:t>
-            </a:r>
-          </a:p>
-          <a:p>
-            <a:pPr lvl="2"/>
-            <a:r>
-              <a:rPr lang="en-GB" dirty="0" smtClean="0"/>
-              <a:t>Optimum </a:t>
-            </a:r>
-            <a:r>
-              <a:rPr lang="en-GB" dirty="0"/>
-              <a:t>frequency to operate in dipole is f=f</a:t>
-            </a:r>
-            <a:r>
-              <a:rPr lang="en-GB" baseline="-25000" dirty="0"/>
-              <a:t>0</a:t>
-            </a:r>
-            <a:r>
-              <a:rPr lang="en-GB" dirty="0"/>
-              <a:t> + ∆f, where ∆f ~ 0.2 MHz (∆f = ∆f (f</a:t>
-            </a:r>
-            <a:r>
-              <a:rPr lang="en-GB" baseline="-25000" dirty="0"/>
-              <a:t>0</a:t>
-            </a:r>
-            <a:r>
-              <a:rPr lang="en-GB" dirty="0" smtClean="0"/>
-              <a:t>))</a:t>
-            </a:r>
-          </a:p>
-          <a:p>
-            <a:pPr lvl="2"/>
-            <a:r>
-              <a:rPr lang="en-GB" dirty="0"/>
-              <a:t>Optimum frequency to operate in </a:t>
-            </a:r>
-            <a:r>
-              <a:rPr lang="en-GB" dirty="0" smtClean="0"/>
-              <a:t>monopole </a:t>
-            </a:r>
-            <a:r>
-              <a:rPr lang="en-GB" dirty="0"/>
-              <a:t>is f=f</a:t>
-            </a:r>
-            <a:r>
-              <a:rPr lang="en-GB" baseline="-25000" dirty="0"/>
-              <a:t>0</a:t>
-            </a:r>
-            <a:r>
-              <a:rPr lang="en-GB" dirty="0"/>
-              <a:t> </a:t>
-            </a:r>
-            <a:r>
-              <a:rPr lang="en-GB" dirty="0" smtClean="0"/>
-              <a:t>- </a:t>
-            </a:r>
-            <a:r>
-              <a:rPr lang="en-GB" dirty="0"/>
-              <a:t>∆f, where ∆f ~ 0.2 MHz (∆f = ∆f (f</a:t>
-            </a:r>
-            <a:r>
-              <a:rPr lang="en-GB" baseline="-25000" dirty="0"/>
-              <a:t>0</a:t>
-            </a:r>
-            <a:r>
-              <a:rPr lang="en-GB" dirty="0"/>
-              <a:t>))</a:t>
-            </a:r>
-          </a:p>
-          <a:p>
-            <a:pPr lvl="2"/>
-            <a:endParaRPr lang="en-GB" dirty="0" smtClean="0"/>
-          </a:p>
-          <a:p>
-            <a:pPr lvl="2"/>
-            <a:endParaRPr lang="en-GB" dirty="0"/>
-          </a:p>
-          <a:p>
-            <a:pPr lvl="1"/>
-            <a:endParaRPr lang="fr-FR" dirty="0"/>
-          </a:p>
-          <a:p>
-            <a:endParaRPr lang="en-GB" dirty="0"/>
-          </a:p>
-        </p:txBody>
-      </p:sp>
-      <p:sp>
-        <p:nvSpPr>
-          <p:cNvPr id="4" name="Espace réservé du texte 3"/>
-          <p:cNvSpPr>
-            <a:spLocks noGrp="1"/>
-          </p:cNvSpPr>
-          <p:nvPr>
-            <p:ph type="body" sz="quarter" idx="12"/>
-          </p:nvPr>
-        </p:nvSpPr>
-        <p:spPr/>
-        <p:txBody>
-          <a:bodyPr/>
-          <a:lstStyle/>
-          <a:p>
-            <a:r>
-              <a:rPr lang="en-GB" dirty="0" smtClean="0"/>
-              <a:t>Assumed: one antenna working at f</a:t>
-            </a:r>
-            <a:r>
-              <a:rPr lang="en-GB" baseline="-25000" dirty="0" smtClean="0"/>
-              <a:t>0</a:t>
-            </a:r>
-            <a:endParaRPr lang="en-GB" dirty="0"/>
-          </a:p>
-        </p:txBody>
-      </p:sp>
-      <p:sp>
-        <p:nvSpPr>
-          <p:cNvPr id="5" name="Espace réservé du numéro de diapositive 4"/>
+          <p:cNvPr id="3" name="Espace réservé du numéro de diapositive 2"/>
           <p:cNvSpPr>
             <a:spLocks noGrp="1"/>
           </p:cNvSpPr>
@@ -16802,10 +17164,57 @@
           </a:p>
         </p:txBody>
       </p:sp>
+      <p:sp>
+        <p:nvSpPr>
+          <p:cNvPr id="10" name="Espace réservé du texte 9"/>
+          <p:cNvSpPr>
+            <a:spLocks noGrp="1"/>
+          </p:cNvSpPr>
+          <p:nvPr>
+            <p:ph type="body" sz="quarter" idx="11"/>
+          </p:nvPr>
+        </p:nvSpPr>
+        <p:spPr>
+          <a:xfrm>
+            <a:off x="1127570" y="4801465"/>
+            <a:ext cx="3749230" cy="498598"/>
+          </a:xfrm>
+        </p:spPr>
+        <p:txBody>
+          <a:bodyPr/>
+          <a:lstStyle/>
+          <a:p>
+            <a:r>
+              <a:rPr lang="en-GB" dirty="0" smtClean="0"/>
+              <a:t>WEST Antenna Matching</a:t>
+            </a:r>
+            <a:endParaRPr lang="en-GB" dirty="0"/>
+          </a:p>
+        </p:txBody>
+      </p:sp>
+      <p:sp>
+        <p:nvSpPr>
+          <p:cNvPr id="11" name="Espace réservé du contenu 10"/>
+          <p:cNvSpPr>
+            <a:spLocks noGrp="1"/>
+          </p:cNvSpPr>
+          <p:nvPr>
+            <p:ph sz="quarter" idx="14"/>
+          </p:nvPr>
+        </p:nvSpPr>
+        <p:spPr/>
+        <p:txBody>
+          <a:bodyPr/>
+          <a:lstStyle/>
+          <a:p>
+            <a:endParaRPr lang="en-GB"/>
+          </a:p>
+        </p:txBody>
+      </p:sp>
     </p:spTree>
     <p:extLst>
       <p:ext uri="{BB962C8B-B14F-4D97-AF65-F5344CB8AC3E}">
-        <p14:creationId xmlns:p14="http://schemas.microsoft.com/office/powerpoint/2010/main" val="1676853691"/>
+        <p14:creationId xmlns:p14="http://schemas.microsoft.com/office/powerpoint/2010/main" val="188869457"/>
       </p:ext>
     </p:extLst>
   </p:cSld>

</xml_diff>